<commit_message>
21.12.03 - 4 (desktop) DO
`1, ppt`
 - 수정
</commit_message>
<xml_diff>
--- a/0.project/ppt/클라우드컴퓨팅_텀프로젝트_pptx_20185304_허주환.pptx
+++ b/0.project/ppt/클라우드컴퓨팅_텀프로젝트_pptx_20185304_허주환.pptx
@@ -4005,7 +4005,7 @@
           <p:spPr>
             <a:xfrm>
               <a:off x="1086277" y="2449618"/>
-              <a:ext cx="1412082" cy="646331"/>
+              <a:ext cx="1672700" cy="827113"/>
             </a:xfrm>
             <a:prstGeom prst="rect">
               <a:avLst/>
@@ -4053,7 +4053,7 @@
           </p:nvSpPr>
           <p:spPr>
             <a:xfrm>
-              <a:off x="5577699" y="4383194"/>
+              <a:off x="5316072" y="4225458"/>
               <a:ext cx="1743074" cy="767006"/>
             </a:xfrm>
             <a:prstGeom prst="rect">
@@ -4620,9 +4620,9 @@
         <p:grpSpPr>
           <a:xfrm>
             <a:off x="1243213" y="1502229"/>
-            <a:ext cx="9141760" cy="4995267"/>
+            <a:ext cx="9256634" cy="4995267"/>
             <a:chOff x="1282402" y="1567543"/>
-            <a:chExt cx="9141760" cy="4995267"/>
+            <a:chExt cx="9256634" cy="4995267"/>
           </a:xfrm>
         </p:grpSpPr>
         <p:pic>
@@ -4780,8 +4780,8 @@
           </p:nvSpPr>
           <p:spPr>
             <a:xfrm>
-              <a:off x="1607370" y="2894036"/>
-              <a:ext cx="1211913" cy="505062"/>
+              <a:off x="1593911" y="2852425"/>
+              <a:ext cx="1399362" cy="369332"/>
             </a:xfrm>
             <a:prstGeom prst="rect">
               <a:avLst/>
@@ -4801,15 +4801,7 @@
               </a:r>
               <a:r>
                 <a:rPr lang="en-US" altLang="ko-KR" dirty="0"/>
-                <a:t>- FE</a:t>
-              </a:r>
-              <a:r>
-                <a:rPr lang="ko-KR" altLang="en-US" dirty="0"/>
-                <a:t> </a:t>
-              </a:r>
-              <a:r>
-                <a:rPr lang="en-US" altLang="ko-KR" dirty="0"/>
-                <a:t>(Vue.js)</a:t>
+                <a:t>-FE</a:t>
               </a:r>
               <a:endParaRPr lang="ko-KR" altLang="en-US" dirty="0"/>
             </a:p>
@@ -4829,8 +4821,8 @@
           </p:nvSpPr>
           <p:spPr>
             <a:xfrm>
-              <a:off x="5462113" y="4404990"/>
-              <a:ext cx="1495986" cy="599361"/>
+              <a:off x="5311820" y="4220323"/>
+              <a:ext cx="1296370" cy="369332"/>
             </a:xfrm>
             <a:prstGeom prst="rect">
               <a:avLst/>
@@ -4853,10 +4845,6 @@
                 <a:t>- BE</a:t>
               </a:r>
             </a:p>
-            <a:p>
-              <a:pPr algn="ctr"/>
-              <a:endParaRPr lang="ko-KR" altLang="en-US" dirty="0"/>
-            </a:p>
           </p:txBody>
         </p:sp>
         <p:sp>
@@ -4873,7 +4861,7 @@
           </p:nvSpPr>
           <p:spPr>
             <a:xfrm>
-              <a:off x="9138674" y="4510577"/>
+              <a:off x="9163637" y="4386935"/>
               <a:ext cx="1066810" cy="288607"/>
             </a:xfrm>
             <a:prstGeom prst="rect">
@@ -4959,7 +4947,7 @@
           </p:nvSpPr>
           <p:spPr>
             <a:xfrm>
-              <a:off x="7260964" y="3514018"/>
+              <a:off x="7153483" y="3840724"/>
               <a:ext cx="1594084" cy="379599"/>
             </a:xfrm>
             <a:prstGeom prst="leftRightArrow">
@@ -5052,7 +5040,7 @@
           </p:nvSpPr>
           <p:spPr>
             <a:xfrm rot="19926230">
-              <a:off x="3195615" y="4391613"/>
+              <a:off x="3220329" y="4383375"/>
               <a:ext cx="1586210" cy="379599"/>
             </a:xfrm>
             <a:prstGeom prst="leftRightArrow">
@@ -5169,7 +5157,7 @@
           </p:blipFill>
           <p:spPr bwMode="auto">
             <a:xfrm rot="19832913">
-              <a:off x="3255940" y="4038865"/>
+              <a:off x="3280654" y="4030627"/>
               <a:ext cx="1100707" cy="506706"/>
             </a:xfrm>
             <a:prstGeom prst="rect">
@@ -5264,10 +5252,13 @@
             <a:p>
               <a:pPr algn="ctr"/>
               <a:r>
-                <a:rPr lang="ko-KR" altLang="en-US"/>
+                <a:rPr lang="ko-KR" altLang="en-US" b="1" dirty="0">
+                  <a:solidFill>
+                    <a:schemeClr val="accent4"/>
+                  </a:solidFill>
+                </a:rPr>
                 <a:t>미구현</a:t>
               </a:r>
-              <a:endParaRPr lang="ko-KR" altLang="en-US" dirty="0"/>
             </a:p>
           </p:txBody>
         </p:sp>
@@ -5285,7 +5276,7 @@
           </p:nvSpPr>
           <p:spPr>
             <a:xfrm>
-              <a:off x="1514986" y="4446137"/>
+              <a:off x="1506748" y="4446137"/>
               <a:ext cx="1683988" cy="1630182"/>
             </a:xfrm>
             <a:prstGeom prst="rect">
@@ -5337,8 +5328,8 @@
           </p:nvSpPr>
           <p:spPr>
             <a:xfrm>
-              <a:off x="1519844" y="6041848"/>
-              <a:ext cx="1679130" cy="520962"/>
+              <a:off x="1506749" y="6041848"/>
+              <a:ext cx="1683988" cy="520962"/>
             </a:xfrm>
             <a:prstGeom prst="rect">
               <a:avLst/>
@@ -5375,7 +5366,460 @@
             </a:p>
           </p:txBody>
         </p:sp>
+        <p:sp>
+          <p:nvSpPr>
+            <p:cNvPr id="23" name="직사각형 22">
+              <a:extLst>
+                <a:ext uri="{FF2B5EF4-FFF2-40B4-BE49-F238E27FC236}">
+                  <a16:creationId xmlns:a16="http://schemas.microsoft.com/office/drawing/2014/main" id="{DBFD03AF-93F0-4717-90FB-EB6A4EF5A911}"/>
+                </a:ext>
+              </a:extLst>
+            </p:cNvPr>
+            <p:cNvSpPr/>
+            <p:nvPr/>
+          </p:nvSpPr>
+          <p:spPr>
+            <a:xfrm>
+              <a:off x="8855048" y="3030935"/>
+              <a:ext cx="1683988" cy="1843228"/>
+            </a:xfrm>
+            <a:prstGeom prst="rect">
+              <a:avLst/>
+            </a:prstGeom>
+            <a:noFill/>
+            <a:ln w="76200">
+              <a:solidFill>
+                <a:schemeClr val="accent1"/>
+              </a:solidFill>
+            </a:ln>
+          </p:spPr>
+          <p:style>
+            <a:lnRef idx="2">
+              <a:schemeClr val="accent1">
+                <a:shade val="50000"/>
+              </a:schemeClr>
+            </a:lnRef>
+            <a:fillRef idx="1">
+              <a:schemeClr val="accent1"/>
+            </a:fillRef>
+            <a:effectRef idx="0">
+              <a:schemeClr val="accent1"/>
+            </a:effectRef>
+            <a:fontRef idx="minor">
+              <a:schemeClr val="lt1"/>
+            </a:fontRef>
+          </p:style>
+          <p:txBody>
+            <a:bodyPr rtlCol="0" anchor="ctr"/>
+            <a:lstStyle/>
+            <a:p>
+              <a:pPr algn="ctr"/>
+              <a:endParaRPr lang="ko-KR" altLang="en-US"/>
+            </a:p>
+          </p:txBody>
+        </p:sp>
+        <p:sp>
+          <p:nvSpPr>
+            <p:cNvPr id="24" name="직사각형 23">
+              <a:extLst>
+                <a:ext uri="{FF2B5EF4-FFF2-40B4-BE49-F238E27FC236}">
+                  <a16:creationId xmlns:a16="http://schemas.microsoft.com/office/drawing/2014/main" id="{08FF6E88-D52C-412B-A413-9D62BCBA7EE2}"/>
+                </a:ext>
+              </a:extLst>
+            </p:cNvPr>
+            <p:cNvSpPr/>
+            <p:nvPr/>
+          </p:nvSpPr>
+          <p:spPr>
+            <a:xfrm>
+              <a:off x="8855048" y="4799906"/>
+              <a:ext cx="1683988" cy="560747"/>
+            </a:xfrm>
+            <a:prstGeom prst="rect">
+              <a:avLst/>
+            </a:prstGeom>
+            <a:noFill/>
+            <a:ln w="76200">
+              <a:solidFill>
+                <a:schemeClr val="accent1"/>
+              </a:solidFill>
+            </a:ln>
+          </p:spPr>
+          <p:style>
+            <a:lnRef idx="2">
+              <a:schemeClr val="accent1">
+                <a:shade val="50000"/>
+              </a:schemeClr>
+            </a:lnRef>
+            <a:fillRef idx="1">
+              <a:schemeClr val="accent1"/>
+            </a:fillRef>
+            <a:effectRef idx="0">
+              <a:schemeClr val="accent1"/>
+            </a:effectRef>
+            <a:fontRef idx="minor">
+              <a:schemeClr val="lt1"/>
+            </a:fontRef>
+          </p:style>
+          <p:txBody>
+            <a:bodyPr rtlCol="0" anchor="ctr"/>
+            <a:lstStyle/>
+            <a:p>
+              <a:pPr algn="ctr"/>
+              <a:endParaRPr lang="ko-KR" altLang="en-US"/>
+            </a:p>
+          </p:txBody>
+        </p:sp>
+        <p:sp>
+          <p:nvSpPr>
+            <p:cNvPr id="25" name="TextBox 24">
+              <a:extLst>
+                <a:ext uri="{FF2B5EF4-FFF2-40B4-BE49-F238E27FC236}">
+                  <a16:creationId xmlns:a16="http://schemas.microsoft.com/office/drawing/2014/main" id="{DF150E09-FBA8-42A0-BB34-134FBC6DBE76}"/>
+                </a:ext>
+              </a:extLst>
+            </p:cNvPr>
+            <p:cNvSpPr txBox="1"/>
+            <p:nvPr/>
+          </p:nvSpPr>
+          <p:spPr>
+            <a:xfrm>
+              <a:off x="9163637" y="4946868"/>
+              <a:ext cx="1066810" cy="369332"/>
+            </a:xfrm>
+            <a:prstGeom prst="rect">
+              <a:avLst/>
+            </a:prstGeom>
+            <a:noFill/>
+          </p:spPr>
+          <p:txBody>
+            <a:bodyPr wrap="square" rtlCol="0">
+              <a:spAutoFit/>
+            </a:bodyPr>
+            <a:lstStyle/>
+            <a:p>
+              <a:pPr algn="ctr"/>
+              <a:r>
+                <a:rPr lang="en-US" altLang="ko-KR" b="1" dirty="0">
+                  <a:solidFill>
+                    <a:schemeClr val="accent1"/>
+                  </a:solidFill>
+                </a:rPr>
+                <a:t>Docker</a:t>
+              </a:r>
+              <a:endParaRPr lang="ko-KR" altLang="en-US" b="1" dirty="0">
+                <a:solidFill>
+                  <a:schemeClr val="accent1"/>
+                </a:solidFill>
+              </a:endParaRPr>
+            </a:p>
+          </p:txBody>
+        </p:sp>
+        <p:sp>
+          <p:nvSpPr>
+            <p:cNvPr id="30" name="TextBox 29">
+              <a:extLst>
+                <a:ext uri="{FF2B5EF4-FFF2-40B4-BE49-F238E27FC236}">
+                  <a16:creationId xmlns:a16="http://schemas.microsoft.com/office/drawing/2014/main" id="{00F2E569-38CB-4729-8C0B-D9B96EB65D8C}"/>
+                </a:ext>
+              </a:extLst>
+            </p:cNvPr>
+            <p:cNvSpPr txBox="1"/>
+            <p:nvPr/>
+          </p:nvSpPr>
+          <p:spPr>
+            <a:xfrm>
+              <a:off x="5136812" y="4873810"/>
+              <a:ext cx="1664267" cy="646331"/>
+            </a:xfrm>
+            <a:prstGeom prst="rect">
+              <a:avLst/>
+            </a:prstGeom>
+            <a:noFill/>
+          </p:spPr>
+          <p:txBody>
+            <a:bodyPr wrap="square" rtlCol="0">
+              <a:spAutoFit/>
+            </a:bodyPr>
+            <a:lstStyle/>
+            <a:p>
+              <a:pPr algn="ctr"/>
+              <a:r>
+                <a:rPr lang="en-US" altLang="ko-KR" b="1" dirty="0">
+                  <a:solidFill>
+                    <a:schemeClr val="accent6"/>
+                  </a:solidFill>
+                </a:rPr>
+                <a:t>Aws Lambda </a:t>
+              </a:r>
+            </a:p>
+            <a:p>
+              <a:pPr algn="ctr"/>
+              <a:r>
+                <a:rPr lang="ko-KR" altLang="en-US" b="1" dirty="0">
+                  <a:solidFill>
+                    <a:schemeClr val="accent6"/>
+                  </a:solidFill>
+                </a:rPr>
+                <a:t>예정</a:t>
+              </a:r>
+            </a:p>
+          </p:txBody>
+        </p:sp>
+        <p:sp>
+          <p:nvSpPr>
+            <p:cNvPr id="34" name="TextBox 33">
+              <a:extLst>
+                <a:ext uri="{FF2B5EF4-FFF2-40B4-BE49-F238E27FC236}">
+                  <a16:creationId xmlns:a16="http://schemas.microsoft.com/office/drawing/2014/main" id="{D0F58CB2-4EFA-4ED5-95D7-3A06C77F92E2}"/>
+                </a:ext>
+              </a:extLst>
+            </p:cNvPr>
+            <p:cNvSpPr txBox="1"/>
+            <p:nvPr/>
+          </p:nvSpPr>
+          <p:spPr>
+            <a:xfrm>
+              <a:off x="1574871" y="3217215"/>
+              <a:ext cx="1399362" cy="369332"/>
+            </a:xfrm>
+            <a:prstGeom prst="rect">
+              <a:avLst/>
+            </a:prstGeom>
+            <a:noFill/>
+          </p:spPr>
+          <p:txBody>
+            <a:bodyPr wrap="square" rtlCol="0">
+              <a:spAutoFit/>
+            </a:bodyPr>
+            <a:lstStyle/>
+            <a:p>
+              <a:pPr algn="ctr"/>
+              <a:r>
+                <a:rPr lang="en-US" altLang="ko-KR" b="1" dirty="0">
+                  <a:solidFill>
+                    <a:schemeClr val="accent6"/>
+                  </a:solidFill>
+                </a:rPr>
+                <a:t>Vue.js</a:t>
+              </a:r>
+              <a:endParaRPr lang="ko-KR" altLang="en-US" b="1" dirty="0">
+                <a:solidFill>
+                  <a:schemeClr val="accent6"/>
+                </a:solidFill>
+              </a:endParaRPr>
+            </a:p>
+          </p:txBody>
+        </p:sp>
       </p:grpSp>
+      <p:sp>
+        <p:nvSpPr>
+          <p:cNvPr id="28" name="직사각형 27">
+            <a:extLst>
+              <a:ext uri="{FF2B5EF4-FFF2-40B4-BE49-F238E27FC236}">
+                <a16:creationId xmlns:a16="http://schemas.microsoft.com/office/drawing/2014/main" id="{1FA51630-84AA-4C07-AACB-EFC5FEC17A2F}"/>
+              </a:ext>
+            </a:extLst>
+          </p:cNvPr>
+          <p:cNvSpPr/>
+          <p:nvPr/>
+        </p:nvSpPr>
+        <p:spPr>
+          <a:xfrm>
+            <a:off x="4871212" y="2906689"/>
+            <a:ext cx="2135602" cy="1843228"/>
+          </a:xfrm>
+          <a:prstGeom prst="rect">
+            <a:avLst/>
+          </a:prstGeom>
+          <a:noFill/>
+          <a:ln w="76200">
+            <a:solidFill>
+              <a:schemeClr val="accent6"/>
+            </a:solidFill>
+          </a:ln>
+        </p:spPr>
+        <p:style>
+          <a:lnRef idx="2">
+            <a:schemeClr val="accent1">
+              <a:shade val="50000"/>
+            </a:schemeClr>
+          </a:lnRef>
+          <a:fillRef idx="1">
+            <a:schemeClr val="accent1"/>
+          </a:fillRef>
+          <a:effectRef idx="0">
+            <a:schemeClr val="accent1"/>
+          </a:effectRef>
+          <a:fontRef idx="minor">
+            <a:schemeClr val="lt1"/>
+          </a:fontRef>
+        </p:style>
+        <p:txBody>
+          <a:bodyPr rtlCol="0" anchor="ctr"/>
+          <a:lstStyle/>
+          <a:p>
+            <a:pPr algn="ctr"/>
+            <a:endParaRPr lang="ko-KR" altLang="en-US"/>
+          </a:p>
+        </p:txBody>
+      </p:sp>
+      <p:sp>
+        <p:nvSpPr>
+          <p:cNvPr id="29" name="직사각형 28">
+            <a:extLst>
+              <a:ext uri="{FF2B5EF4-FFF2-40B4-BE49-F238E27FC236}">
+                <a16:creationId xmlns:a16="http://schemas.microsoft.com/office/drawing/2014/main" id="{03B6F229-499A-4A54-AACF-E17D522824C6}"/>
+              </a:ext>
+            </a:extLst>
+          </p:cNvPr>
+          <p:cNvSpPr/>
+          <p:nvPr/>
+        </p:nvSpPr>
+        <p:spPr>
+          <a:xfrm>
+            <a:off x="4871212" y="4675660"/>
+            <a:ext cx="2135602" cy="779167"/>
+          </a:xfrm>
+          <a:prstGeom prst="rect">
+            <a:avLst/>
+          </a:prstGeom>
+          <a:noFill/>
+          <a:ln w="76200">
+            <a:solidFill>
+              <a:schemeClr val="accent6"/>
+            </a:solidFill>
+          </a:ln>
+        </p:spPr>
+        <p:style>
+          <a:lnRef idx="2">
+            <a:schemeClr val="accent1">
+              <a:shade val="50000"/>
+            </a:schemeClr>
+          </a:lnRef>
+          <a:fillRef idx="1">
+            <a:schemeClr val="accent1"/>
+          </a:fillRef>
+          <a:effectRef idx="0">
+            <a:schemeClr val="accent1"/>
+          </a:effectRef>
+          <a:fontRef idx="minor">
+            <a:schemeClr val="lt1"/>
+          </a:fontRef>
+        </p:style>
+        <p:txBody>
+          <a:bodyPr rtlCol="0" anchor="ctr"/>
+          <a:lstStyle/>
+          <a:p>
+            <a:pPr algn="ctr"/>
+            <a:endParaRPr lang="ko-KR" altLang="en-US"/>
+          </a:p>
+        </p:txBody>
+      </p:sp>
+      <p:sp>
+        <p:nvSpPr>
+          <p:cNvPr id="32" name="직사각형 31">
+            <a:extLst>
+              <a:ext uri="{FF2B5EF4-FFF2-40B4-BE49-F238E27FC236}">
+                <a16:creationId xmlns:a16="http://schemas.microsoft.com/office/drawing/2014/main" id="{38C047C2-CB60-4DB8-B0D7-8EE6D4565819}"/>
+              </a:ext>
+            </a:extLst>
+          </p:cNvPr>
+          <p:cNvSpPr/>
+          <p:nvPr/>
+        </p:nvSpPr>
+        <p:spPr>
+          <a:xfrm>
+            <a:off x="1426388" y="1465038"/>
+            <a:ext cx="1620513" cy="1639213"/>
+          </a:xfrm>
+          <a:prstGeom prst="rect">
+            <a:avLst/>
+          </a:prstGeom>
+          <a:noFill/>
+          <a:ln w="76200">
+            <a:solidFill>
+              <a:schemeClr val="accent6"/>
+            </a:solidFill>
+          </a:ln>
+        </p:spPr>
+        <p:style>
+          <a:lnRef idx="2">
+            <a:schemeClr val="accent1">
+              <a:shade val="50000"/>
+            </a:schemeClr>
+          </a:lnRef>
+          <a:fillRef idx="1">
+            <a:schemeClr val="accent1"/>
+          </a:fillRef>
+          <a:effectRef idx="0">
+            <a:schemeClr val="accent1"/>
+          </a:effectRef>
+          <a:fontRef idx="minor">
+            <a:schemeClr val="lt1"/>
+          </a:fontRef>
+        </p:style>
+        <p:txBody>
+          <a:bodyPr rtlCol="0" anchor="ctr"/>
+          <a:lstStyle/>
+          <a:p>
+            <a:pPr algn="ctr"/>
+            <a:endParaRPr lang="ko-KR" altLang="en-US"/>
+          </a:p>
+        </p:txBody>
+      </p:sp>
+      <p:sp>
+        <p:nvSpPr>
+          <p:cNvPr id="33" name="직사각형 32">
+            <a:extLst>
+              <a:ext uri="{FF2B5EF4-FFF2-40B4-BE49-F238E27FC236}">
+                <a16:creationId xmlns:a16="http://schemas.microsoft.com/office/drawing/2014/main" id="{627FF9A7-ADAB-4ECB-8328-43FC3BF17B7D}"/>
+              </a:ext>
+            </a:extLst>
+          </p:cNvPr>
+          <p:cNvSpPr/>
+          <p:nvPr/>
+        </p:nvSpPr>
+        <p:spPr>
+          <a:xfrm>
+            <a:off x="1426388" y="3156444"/>
+            <a:ext cx="1620513" cy="358034"/>
+          </a:xfrm>
+          <a:prstGeom prst="rect">
+            <a:avLst/>
+          </a:prstGeom>
+          <a:noFill/>
+          <a:ln w="76200">
+            <a:solidFill>
+              <a:schemeClr val="accent6"/>
+            </a:solidFill>
+          </a:ln>
+        </p:spPr>
+        <p:style>
+          <a:lnRef idx="2">
+            <a:schemeClr val="accent1">
+              <a:shade val="50000"/>
+            </a:schemeClr>
+          </a:lnRef>
+          <a:fillRef idx="1">
+            <a:schemeClr val="accent1"/>
+          </a:fillRef>
+          <a:effectRef idx="0">
+            <a:schemeClr val="accent1"/>
+          </a:effectRef>
+          <a:fontRef idx="minor">
+            <a:schemeClr val="lt1"/>
+          </a:fontRef>
+        </p:style>
+        <p:txBody>
+          <a:bodyPr rtlCol="0" anchor="ctr"/>
+          <a:lstStyle/>
+          <a:p>
+            <a:pPr algn="ctr"/>
+            <a:endParaRPr lang="ko-KR" altLang="en-US"/>
+          </a:p>
+        </p:txBody>
+      </p:sp>
     </p:spTree>
     <p:extLst>
       <p:ext uri="{BB962C8B-B14F-4D97-AF65-F5344CB8AC3E}">
@@ -6367,10 +6811,9 @@
               <a:t>버스의 연착 여부 및 시간별로 운행할 버스 노선이 다름</a:t>
             </a:r>
             <a:r>
-              <a:rPr lang="en-US" altLang="ko-KR"/>
+              <a:rPr lang="en-US" altLang="ko-KR" dirty="0"/>
               <a:t>)</a:t>
             </a:r>
-            <a:endParaRPr lang="en-US" altLang="ko-KR" dirty="0"/>
           </a:p>
           <a:p>
             <a:pPr marL="342900" indent="-342900" algn="l">
@@ -6410,6 +6853,36 @@
               <a:rPr lang="en-US" altLang="ko-KR" dirty="0"/>
               <a:t>(Android)</a:t>
             </a:r>
+          </a:p>
+          <a:p>
+            <a:pPr marL="342900" indent="-342900" algn="l">
+              <a:buFont typeface="Arial" panose="020B0604020202020204" pitchFamily="34" charset="0"/>
+              <a:buChar char="•"/>
+            </a:pPr>
+            <a:endParaRPr lang="en-US" altLang="ko-KR" dirty="0"/>
+          </a:p>
+          <a:p>
+            <a:pPr marL="342900" indent="-342900" algn="l">
+              <a:buFont typeface="Arial" panose="020B0604020202020204" pitchFamily="34" charset="0"/>
+              <a:buChar char="•"/>
+            </a:pPr>
+            <a:r>
+              <a:rPr lang="en-US" altLang="ko-KR" dirty="0"/>
+              <a:t>BE(Spring Boot)</a:t>
+            </a:r>
+            <a:r>
+              <a:rPr lang="ko-KR" altLang="en-US" dirty="0"/>
+              <a:t>를 </a:t>
+            </a:r>
+            <a:r>
+              <a:rPr lang="en-US" altLang="ko-KR" dirty="0"/>
+              <a:t>AWS Lambda</a:t>
+            </a:r>
+            <a:r>
+              <a:rPr lang="ko-KR" altLang="en-US" dirty="0"/>
+              <a:t>를 사용해볼 예정</a:t>
+            </a:r>
+            <a:endParaRPr lang="en-US" altLang="ko-KR" dirty="0"/>
           </a:p>
         </p:txBody>
       </p:sp>

</xml_diff>